<commit_message>
change file Tu duy ranh mach
</commit_message>
<xml_diff>
--- a/Tuduyranhmach.pptx
+++ b/Tuduyranhmach.pptx
@@ -216,7 +216,7 @@
           <a:p>
             <a:fld id="{2FFFA13A-DC53-46B8-BD0E-488FDF6D4DEC}" type="datetimeFigureOut">
               <a:rPr lang="en-US" smtClean="0"/>
-              <a:t>10/4/19</a:t>
+              <a:t>3/4/21</a:t>
             </a:fld>
             <a:endParaRPr lang="en-US"/>
           </a:p>
@@ -2211,7 +2211,7 @@
                 </a:solidFill>
                 <a:latin typeface="Myriad Pro Light" panose="020B0403030403020204" pitchFamily="34" charset="0"/>
               </a:rPr>
-              <a:t>2019</a:t>
+              <a:t>2021</a:t>
             </a:r>
             <a:endParaRPr lang="en-US" sz="1500" i="1" dirty="0">
               <a:solidFill>

</xml_diff>